<commit_message>
Completed the PowerPoint presentation and trimmed an image.
</commit_message>
<xml_diff>
--- a/Milestone 2/Milestone 2.pptx
+++ b/Milestone 2/Milestone 2.pptx
@@ -4315,65 +4315,75 @@
           <a:chExt cx="0" cy="0"/>
         </a:xfrm>
       </p:grpSpPr>
-      <p:sp>
-        <p:nvSpPr>
-          <p:cNvPr id="3074" name="Title 1">
-            <a:extLst>
-              <a:ext uri="{FF2B5EF4-FFF2-40B4-BE49-F238E27FC236}">
-                <a16:creationId xmlns:a16="http://schemas.microsoft.com/office/drawing/2014/main" id="{041C640B-8EC9-4B2D-A4F2-C6AB0E8F84FB}"/>
-              </a:ext>
-            </a:extLst>
-          </p:cNvPr>
-          <p:cNvSpPr>
-            <a:spLocks noGrp="1" noChangeArrowheads="1"/>
-          </p:cNvSpPr>
-          <p:nvPr>
-            <p:ph type="title"/>
-          </p:nvPr>
-        </p:nvSpPr>
-        <p:spPr/>
-        <p:txBody>
-          <a:bodyPr/>
-          <a:lstStyle/>
-          <a:p>
-            <a:pPr eaLnBrk="1" hangingPunct="1"/>
-            <a:r>
-              <a:rPr lang="en-US" altLang="en-US" sz="5000" dirty="0"/>
-              <a:t>Idea Sheets</a:t>
-            </a:r>
-            <a:endParaRPr lang="en-CA" altLang="en-US" sz="5000" dirty="0"/>
-          </a:p>
-        </p:txBody>
-      </p:sp>
-      <p:sp>
-        <p:nvSpPr>
-          <p:cNvPr id="3075" name="Content Placeholder 2">
-            <a:extLst>
-              <a:ext uri="{FF2B5EF4-FFF2-40B4-BE49-F238E27FC236}">
-                <a16:creationId xmlns:a16="http://schemas.microsoft.com/office/drawing/2014/main" id="{8B8369D6-952D-4ABB-B53E-E790BE24B947}"/>
-              </a:ext>
-            </a:extLst>
-          </p:cNvPr>
-          <p:cNvSpPr>
-            <a:spLocks noGrp="1" noChangeArrowheads="1"/>
-          </p:cNvSpPr>
+      <p:pic>
+        <p:nvPicPr>
+          <p:cNvPr id="5" name="Content Placeholder 4">
+            <a:extLst>
+              <a:ext uri="{FF2B5EF4-FFF2-40B4-BE49-F238E27FC236}">
+                <a16:creationId xmlns:a16="http://schemas.microsoft.com/office/drawing/2014/main" id="{FD598008-2318-4C32-A3E3-EE0CF32A7545}"/>
+              </a:ext>
+            </a:extLst>
+          </p:cNvPr>
+          <p:cNvPicPr>
+            <a:picLocks noGrp="1" noChangeAspect="1"/>
+          </p:cNvPicPr>
           <p:nvPr>
             <p:ph idx="1"/>
           </p:nvPr>
-        </p:nvSpPr>
+        </p:nvPicPr>
+        <p:blipFill rotWithShape="1">
+          <a:blip r:embed="rId2">
+            <a:extLst>
+              <a:ext uri="{28A0092B-C50C-407E-A947-70E740481C1C}">
+                <a14:useLocalDpi xmlns:a14="http://schemas.microsoft.com/office/drawing/2010/main" val="0"/>
+              </a:ext>
+            </a:extLst>
+          </a:blip>
+          <a:srcRect t="1992"/>
+          <a:stretch/>
+        </p:blipFill>
         <p:spPr>
           <a:xfrm>
-            <a:off x="838200" y="1825624"/>
-            <a:ext cx="10515600" cy="4296879"/>
+            <a:off x="799803" y="133132"/>
+            <a:ext cx="10592394" cy="6591736"/>
           </a:xfrm>
         </p:spPr>
-        <p:txBody>
-          <a:bodyPr/>
+      </p:pic>
+      <p:sp>
+        <p:nvSpPr>
+          <p:cNvPr id="8" name="Rectangle 7">
+            <a:extLst>
+              <a:ext uri="{FF2B5EF4-FFF2-40B4-BE49-F238E27FC236}">
+                <a16:creationId xmlns:a16="http://schemas.microsoft.com/office/drawing/2014/main" id="{D8B1AA77-165D-4B82-8D31-87DF82D5C456}"/>
+              </a:ext>
+            </a:extLst>
+          </p:cNvPr>
+          <p:cNvSpPr/>
+          <p:nvPr/>
+        </p:nvSpPr>
+        <p:spPr>
+          <a:xfrm>
+            <a:off x="8004731" y="133132"/>
+            <a:ext cx="3387466" cy="369332"/>
+          </a:xfrm>
+          <a:prstGeom prst="rect">
+            <a:avLst/>
+          </a:prstGeom>
+        </p:spPr>
+        <p:txBody>
+          <a:bodyPr wrap="none">
+            <a:spAutoFit/>
+          </a:bodyPr>
           <a:lstStyle/>
           <a:p>
-            <a:pPr eaLnBrk="1" hangingPunct="1">
-              <a:defRPr/>
-            </a:pPr>
+            <a:r>
+              <a:rPr lang="en-US" b="1" dirty="0"/>
+              <a:t>Category:</a:t>
+            </a:r>
+            <a:r>
+              <a:rPr lang="en-US" dirty="0"/>
+              <a:t> Communication Process</a:t>
+            </a:r>
             <a:endParaRPr lang="en-CA" dirty="0"/>
           </a:p>
         </p:txBody>
@@ -4408,65 +4418,77 @@
           <a:chExt cx="0" cy="0"/>
         </a:xfrm>
       </p:grpSpPr>
-      <p:sp>
-        <p:nvSpPr>
-          <p:cNvPr id="3074" name="Title 1">
-            <a:extLst>
-              <a:ext uri="{FF2B5EF4-FFF2-40B4-BE49-F238E27FC236}">
-                <a16:creationId xmlns:a16="http://schemas.microsoft.com/office/drawing/2014/main" id="{041C640B-8EC9-4B2D-A4F2-C6AB0E8F84FB}"/>
-              </a:ext>
-            </a:extLst>
-          </p:cNvPr>
-          <p:cNvSpPr>
-            <a:spLocks noGrp="1" noChangeArrowheads="1"/>
-          </p:cNvSpPr>
-          <p:nvPr>
-            <p:ph type="title"/>
-          </p:nvPr>
-        </p:nvSpPr>
-        <p:spPr/>
-        <p:txBody>
-          <a:bodyPr/>
-          <a:lstStyle/>
-          <a:p>
-            <a:pPr eaLnBrk="1" hangingPunct="1"/>
-            <a:r>
-              <a:rPr lang="en-US" altLang="en-US" sz="5000" dirty="0"/>
-              <a:t>Idea Sheets</a:t>
-            </a:r>
-            <a:endParaRPr lang="en-CA" altLang="en-US" sz="5000" dirty="0"/>
-          </a:p>
-        </p:txBody>
-      </p:sp>
-      <p:sp>
-        <p:nvSpPr>
-          <p:cNvPr id="3075" name="Content Placeholder 2">
-            <a:extLst>
-              <a:ext uri="{FF2B5EF4-FFF2-40B4-BE49-F238E27FC236}">
-                <a16:creationId xmlns:a16="http://schemas.microsoft.com/office/drawing/2014/main" id="{8B8369D6-952D-4ABB-B53E-E790BE24B947}"/>
-              </a:ext>
-            </a:extLst>
-          </p:cNvPr>
-          <p:cNvSpPr>
-            <a:spLocks noGrp="1" noChangeArrowheads="1"/>
-          </p:cNvSpPr>
-          <p:nvPr>
-            <p:ph idx="1"/>
-          </p:nvPr>
-        </p:nvSpPr>
+      <p:pic>
+        <p:nvPicPr>
+          <p:cNvPr id="7" name="Picture 6">
+            <a:extLst>
+              <a:ext uri="{FF2B5EF4-FFF2-40B4-BE49-F238E27FC236}">
+                <a16:creationId xmlns:a16="http://schemas.microsoft.com/office/drawing/2014/main" id="{6E881968-6B14-4EB1-9422-133651602034}"/>
+              </a:ext>
+            </a:extLst>
+          </p:cNvPr>
+          <p:cNvPicPr>
+            <a:picLocks noChangeAspect="1"/>
+          </p:cNvPicPr>
+          <p:nvPr/>
+        </p:nvPicPr>
+        <p:blipFill>
+          <a:blip r:embed="rId2">
+            <a:extLst>
+              <a:ext uri="{28A0092B-C50C-407E-A947-70E740481C1C}">
+                <a14:useLocalDpi xmlns:a14="http://schemas.microsoft.com/office/drawing/2010/main" val="0"/>
+              </a:ext>
+            </a:extLst>
+          </a:blip>
+          <a:stretch>
+            <a:fillRect/>
+          </a:stretch>
+        </p:blipFill>
         <p:spPr>
           <a:xfrm>
-            <a:off x="838200" y="1825624"/>
-            <a:ext cx="10515600" cy="4296879"/>
+            <a:off x="1231599" y="112363"/>
+            <a:ext cx="9728802" cy="6633274"/>
           </a:xfrm>
+          <a:prstGeom prst="rect">
+            <a:avLst/>
+          </a:prstGeom>
         </p:spPr>
-        <p:txBody>
-          <a:bodyPr/>
+      </p:pic>
+      <p:sp>
+        <p:nvSpPr>
+          <p:cNvPr id="8" name="Rectangle 7">
+            <a:extLst>
+              <a:ext uri="{FF2B5EF4-FFF2-40B4-BE49-F238E27FC236}">
+                <a16:creationId xmlns:a16="http://schemas.microsoft.com/office/drawing/2014/main" id="{8D1620A3-A919-4617-960F-F40BA96BED7F}"/>
+              </a:ext>
+            </a:extLst>
+          </p:cNvPr>
+          <p:cNvSpPr/>
+          <p:nvPr/>
+        </p:nvSpPr>
+        <p:spPr>
+          <a:xfrm>
+            <a:off x="7559598" y="112363"/>
+            <a:ext cx="3400803" cy="369332"/>
+          </a:xfrm>
+          <a:prstGeom prst="rect">
+            <a:avLst/>
+          </a:prstGeom>
+        </p:spPr>
+        <p:txBody>
+          <a:bodyPr wrap="none">
+            <a:spAutoFit/>
+          </a:bodyPr>
           <a:lstStyle/>
           <a:p>
-            <a:pPr eaLnBrk="1" hangingPunct="1">
-              <a:defRPr/>
-            </a:pPr>
+            <a:r>
+              <a:rPr lang="en-US" b="1" dirty="0"/>
+              <a:t>Category:</a:t>
+            </a:r>
+            <a:r>
+              <a:rPr lang="en-US" dirty="0"/>
+              <a:t> Communication Process</a:t>
+            </a:r>
             <a:endParaRPr lang="en-CA" dirty="0"/>
           </a:p>
         </p:txBody>
@@ -4501,65 +4523,77 @@
           <a:chExt cx="0" cy="0"/>
         </a:xfrm>
       </p:grpSpPr>
-      <p:sp>
-        <p:nvSpPr>
-          <p:cNvPr id="3074" name="Title 1">
-            <a:extLst>
-              <a:ext uri="{FF2B5EF4-FFF2-40B4-BE49-F238E27FC236}">
-                <a16:creationId xmlns:a16="http://schemas.microsoft.com/office/drawing/2014/main" id="{041C640B-8EC9-4B2D-A4F2-C6AB0E8F84FB}"/>
-              </a:ext>
-            </a:extLst>
-          </p:cNvPr>
-          <p:cNvSpPr>
-            <a:spLocks noGrp="1" noChangeArrowheads="1"/>
-          </p:cNvSpPr>
-          <p:nvPr>
-            <p:ph type="title"/>
-          </p:nvPr>
-        </p:nvSpPr>
-        <p:spPr/>
-        <p:txBody>
-          <a:bodyPr/>
-          <a:lstStyle/>
-          <a:p>
-            <a:pPr eaLnBrk="1" hangingPunct="1"/>
-            <a:r>
-              <a:rPr lang="en-US" altLang="en-US" sz="5000" dirty="0"/>
-              <a:t>Idea Sheets</a:t>
-            </a:r>
-            <a:endParaRPr lang="en-CA" altLang="en-US" sz="5000" dirty="0"/>
-          </a:p>
-        </p:txBody>
-      </p:sp>
-      <p:sp>
-        <p:nvSpPr>
-          <p:cNvPr id="3075" name="Content Placeholder 2">
-            <a:extLst>
-              <a:ext uri="{FF2B5EF4-FFF2-40B4-BE49-F238E27FC236}">
-                <a16:creationId xmlns:a16="http://schemas.microsoft.com/office/drawing/2014/main" id="{8B8369D6-952D-4ABB-B53E-E790BE24B947}"/>
-              </a:ext>
-            </a:extLst>
-          </p:cNvPr>
-          <p:cNvSpPr>
-            <a:spLocks noGrp="1" noChangeArrowheads="1"/>
-          </p:cNvSpPr>
-          <p:nvPr>
-            <p:ph idx="1"/>
-          </p:nvPr>
-        </p:nvSpPr>
+      <p:pic>
+        <p:nvPicPr>
+          <p:cNvPr id="7" name="Picture 6">
+            <a:extLst>
+              <a:ext uri="{FF2B5EF4-FFF2-40B4-BE49-F238E27FC236}">
+                <a16:creationId xmlns:a16="http://schemas.microsoft.com/office/drawing/2014/main" id="{BF99211C-9572-4C39-8F23-8573374CF129}"/>
+              </a:ext>
+            </a:extLst>
+          </p:cNvPr>
+          <p:cNvPicPr>
+            <a:picLocks noChangeAspect="1"/>
+          </p:cNvPicPr>
+          <p:nvPr/>
+        </p:nvPicPr>
+        <p:blipFill>
+          <a:blip r:embed="rId2">
+            <a:extLst>
+              <a:ext uri="{28A0092B-C50C-407E-A947-70E740481C1C}">
+                <a14:useLocalDpi xmlns:a14="http://schemas.microsoft.com/office/drawing/2010/main" val="0"/>
+              </a:ext>
+            </a:extLst>
+          </a:blip>
+          <a:stretch>
+            <a:fillRect/>
+          </a:stretch>
+        </p:blipFill>
         <p:spPr>
           <a:xfrm>
-            <a:off x="838200" y="1825624"/>
-            <a:ext cx="10515600" cy="4296879"/>
+            <a:off x="1394109" y="214890"/>
+            <a:ext cx="9403781" cy="6428219"/>
           </a:xfrm>
+          <a:prstGeom prst="rect">
+            <a:avLst/>
+          </a:prstGeom>
         </p:spPr>
-        <p:txBody>
-          <a:bodyPr/>
+      </p:pic>
+      <p:sp>
+        <p:nvSpPr>
+          <p:cNvPr id="8" name="Rectangle 7">
+            <a:extLst>
+              <a:ext uri="{FF2B5EF4-FFF2-40B4-BE49-F238E27FC236}">
+                <a16:creationId xmlns:a16="http://schemas.microsoft.com/office/drawing/2014/main" id="{C59A2CAA-50E5-490F-9B0C-C0F4E3D10081}"/>
+              </a:ext>
+            </a:extLst>
+          </p:cNvPr>
+          <p:cNvSpPr/>
+          <p:nvPr/>
+        </p:nvSpPr>
+        <p:spPr>
+          <a:xfrm>
+            <a:off x="8047201" y="214890"/>
+            <a:ext cx="2750689" cy="369332"/>
+          </a:xfrm>
+          <a:prstGeom prst="rect">
+            <a:avLst/>
+          </a:prstGeom>
+        </p:spPr>
+        <p:txBody>
+          <a:bodyPr wrap="none">
+            <a:spAutoFit/>
+          </a:bodyPr>
           <a:lstStyle/>
           <a:p>
-            <a:pPr eaLnBrk="1" hangingPunct="1">
-              <a:defRPr/>
-            </a:pPr>
+            <a:r>
+              <a:rPr lang="en-US" b="1" dirty="0"/>
+              <a:t>Category:</a:t>
+            </a:r>
+            <a:r>
+              <a:rPr lang="en-US" dirty="0"/>
+              <a:t> Approval Process</a:t>
+            </a:r>
             <a:endParaRPr lang="en-CA" dirty="0"/>
           </a:p>
         </p:txBody>
@@ -4594,65 +4628,77 @@
           <a:chExt cx="0" cy="0"/>
         </a:xfrm>
       </p:grpSpPr>
-      <p:sp>
-        <p:nvSpPr>
-          <p:cNvPr id="3074" name="Title 1">
-            <a:extLst>
-              <a:ext uri="{FF2B5EF4-FFF2-40B4-BE49-F238E27FC236}">
-                <a16:creationId xmlns:a16="http://schemas.microsoft.com/office/drawing/2014/main" id="{041C640B-8EC9-4B2D-A4F2-C6AB0E8F84FB}"/>
-              </a:ext>
-            </a:extLst>
-          </p:cNvPr>
-          <p:cNvSpPr>
-            <a:spLocks noGrp="1" noChangeArrowheads="1"/>
-          </p:cNvSpPr>
-          <p:nvPr>
-            <p:ph type="title"/>
-          </p:nvPr>
-        </p:nvSpPr>
-        <p:spPr/>
-        <p:txBody>
-          <a:bodyPr/>
-          <a:lstStyle/>
-          <a:p>
-            <a:pPr eaLnBrk="1" hangingPunct="1"/>
-            <a:r>
-              <a:rPr lang="en-US" altLang="en-US" sz="5000" dirty="0"/>
-              <a:t>Idea Sheets</a:t>
-            </a:r>
-            <a:endParaRPr lang="en-CA" altLang="en-US" sz="5000" dirty="0"/>
-          </a:p>
-        </p:txBody>
-      </p:sp>
-      <p:sp>
-        <p:nvSpPr>
-          <p:cNvPr id="3075" name="Content Placeholder 2">
-            <a:extLst>
-              <a:ext uri="{FF2B5EF4-FFF2-40B4-BE49-F238E27FC236}">
-                <a16:creationId xmlns:a16="http://schemas.microsoft.com/office/drawing/2014/main" id="{8B8369D6-952D-4ABB-B53E-E790BE24B947}"/>
-              </a:ext>
-            </a:extLst>
-          </p:cNvPr>
-          <p:cNvSpPr>
-            <a:spLocks noGrp="1" noChangeArrowheads="1"/>
-          </p:cNvSpPr>
-          <p:nvPr>
-            <p:ph idx="1"/>
-          </p:nvPr>
-        </p:nvSpPr>
+      <p:pic>
+        <p:nvPicPr>
+          <p:cNvPr id="9" name="Picture 8">
+            <a:extLst>
+              <a:ext uri="{FF2B5EF4-FFF2-40B4-BE49-F238E27FC236}">
+                <a16:creationId xmlns:a16="http://schemas.microsoft.com/office/drawing/2014/main" id="{2EBB3C0B-A32E-4F0C-B112-8DACD975D12D}"/>
+              </a:ext>
+            </a:extLst>
+          </p:cNvPr>
+          <p:cNvPicPr>
+            <a:picLocks noChangeAspect="1"/>
+          </p:cNvPicPr>
+          <p:nvPr/>
+        </p:nvPicPr>
+        <p:blipFill>
+          <a:blip r:embed="rId2">
+            <a:extLst>
+              <a:ext uri="{28A0092B-C50C-407E-A947-70E740481C1C}">
+                <a14:useLocalDpi xmlns:a14="http://schemas.microsoft.com/office/drawing/2010/main" val="0"/>
+              </a:ext>
+            </a:extLst>
+          </a:blip>
+          <a:stretch>
+            <a:fillRect/>
+          </a:stretch>
+        </p:blipFill>
         <p:spPr>
           <a:xfrm>
-            <a:off x="838200" y="1825624"/>
-            <a:ext cx="10515600" cy="4296879"/>
+            <a:off x="1226135" y="143150"/>
+            <a:ext cx="9739730" cy="6571699"/>
           </a:xfrm>
+          <a:prstGeom prst="rect">
+            <a:avLst/>
+          </a:prstGeom>
         </p:spPr>
-        <p:txBody>
-          <a:bodyPr/>
+      </p:pic>
+      <p:sp>
+        <p:nvSpPr>
+          <p:cNvPr id="10" name="Rectangle 9">
+            <a:extLst>
+              <a:ext uri="{FF2B5EF4-FFF2-40B4-BE49-F238E27FC236}">
+                <a16:creationId xmlns:a16="http://schemas.microsoft.com/office/drawing/2014/main" id="{C52746F8-8B2D-40C4-A8E0-90EA26CD174B}"/>
+              </a:ext>
+            </a:extLst>
+          </p:cNvPr>
+          <p:cNvSpPr/>
+          <p:nvPr/>
+        </p:nvSpPr>
+        <p:spPr>
+          <a:xfrm>
+            <a:off x="8215176" y="143150"/>
+            <a:ext cx="2750689" cy="369332"/>
+          </a:xfrm>
+          <a:prstGeom prst="rect">
+            <a:avLst/>
+          </a:prstGeom>
+        </p:spPr>
+        <p:txBody>
+          <a:bodyPr wrap="none">
+            <a:spAutoFit/>
+          </a:bodyPr>
           <a:lstStyle/>
           <a:p>
-            <a:pPr eaLnBrk="1" hangingPunct="1">
-              <a:defRPr/>
-            </a:pPr>
+            <a:r>
+              <a:rPr lang="en-US" b="1" dirty="0"/>
+              <a:t>Category:</a:t>
+            </a:r>
+            <a:r>
+              <a:rPr lang="en-US" dirty="0"/>
+              <a:t> Approval Process</a:t>
+            </a:r>
             <a:endParaRPr lang="en-CA" dirty="0"/>
           </a:p>
         </p:txBody>
@@ -4687,72 +4733,42 @@
           <a:chExt cx="0" cy="0"/>
         </a:xfrm>
       </p:grpSpPr>
-      <p:sp>
-        <p:nvSpPr>
-          <p:cNvPr id="3074" name="Title 1">
-            <a:extLst>
-              <a:ext uri="{FF2B5EF4-FFF2-40B4-BE49-F238E27FC236}">
-                <a16:creationId xmlns:a16="http://schemas.microsoft.com/office/drawing/2014/main" id="{041C640B-8EC9-4B2D-A4F2-C6AB0E8F84FB}"/>
-              </a:ext>
-            </a:extLst>
-          </p:cNvPr>
-          <p:cNvSpPr>
-            <a:spLocks noGrp="1" noChangeArrowheads="1"/>
-          </p:cNvSpPr>
-          <p:nvPr>
-            <p:ph type="title"/>
-          </p:nvPr>
-        </p:nvSpPr>
-        <p:spPr/>
-        <p:txBody>
-          <a:bodyPr/>
-          <a:lstStyle/>
-          <a:p>
-            <a:pPr eaLnBrk="1" hangingPunct="1"/>
-            <a:r>
-              <a:rPr lang="en-US" altLang="en-US" sz="5000" dirty="0"/>
-              <a:t>Future State VSM</a:t>
-            </a:r>
-            <a:endParaRPr lang="en-CA" altLang="en-US" sz="5000" dirty="0"/>
-          </a:p>
-        </p:txBody>
-      </p:sp>
-      <p:sp>
-        <p:nvSpPr>
-          <p:cNvPr id="3075" name="Content Placeholder 2">
-            <a:extLst>
-              <a:ext uri="{FF2B5EF4-FFF2-40B4-BE49-F238E27FC236}">
-                <a16:creationId xmlns:a16="http://schemas.microsoft.com/office/drawing/2014/main" id="{8B8369D6-952D-4ABB-B53E-E790BE24B947}"/>
-              </a:ext>
-            </a:extLst>
-          </p:cNvPr>
-          <p:cNvSpPr>
-            <a:spLocks noGrp="1" noChangeArrowheads="1"/>
-          </p:cNvSpPr>
-          <p:nvPr>
-            <p:ph idx="1"/>
-          </p:nvPr>
-        </p:nvSpPr>
+      <p:pic>
+        <p:nvPicPr>
+          <p:cNvPr id="7" name="Picture 6">
+            <a:extLst>
+              <a:ext uri="{FF2B5EF4-FFF2-40B4-BE49-F238E27FC236}">
+                <a16:creationId xmlns:a16="http://schemas.microsoft.com/office/drawing/2014/main" id="{AF3087AC-DF55-4F3C-A29E-3CC2C881AD17}"/>
+              </a:ext>
+            </a:extLst>
+          </p:cNvPr>
+          <p:cNvPicPr>
+            <a:picLocks noChangeAspect="1"/>
+          </p:cNvPicPr>
+          <p:nvPr/>
+        </p:nvPicPr>
+        <p:blipFill>
+          <a:blip r:embed="rId2">
+            <a:extLst>
+              <a:ext uri="{28A0092B-C50C-407E-A947-70E740481C1C}">
+                <a14:useLocalDpi xmlns:a14="http://schemas.microsoft.com/office/drawing/2010/main" val="0"/>
+              </a:ext>
+            </a:extLst>
+          </a:blip>
+          <a:stretch>
+            <a:fillRect/>
+          </a:stretch>
+        </p:blipFill>
         <p:spPr>
           <a:xfrm>
-            <a:off x="838200" y="1825624"/>
-            <a:ext cx="10515600" cy="4296879"/>
+            <a:off x="170388" y="422386"/>
+            <a:ext cx="11851223" cy="5801193"/>
           </a:xfrm>
+          <a:prstGeom prst="rect">
+            <a:avLst/>
+          </a:prstGeom>
         </p:spPr>
-        <p:txBody>
-          <a:bodyPr/>
-          <a:lstStyle/>
-          <a:p>
-            <a:pPr eaLnBrk="1" hangingPunct="1">
-              <a:defRPr/>
-            </a:pPr>
-            <a:r>
-              <a:rPr lang="en-CA" dirty="0"/>
-              <a:t>Insert our completed Future State VSM on this slide</a:t>
-            </a:r>
-          </a:p>
-        </p:txBody>
-      </p:sp>
+      </p:pic>
     </p:spTree>
     <p:extLst>
       <p:ext uri="{BB962C8B-B14F-4D97-AF65-F5344CB8AC3E}">
@@ -4829,7 +4845,12 @@
             <p:ph idx="1"/>
           </p:nvPr>
         </p:nvSpPr>
-        <p:spPr/>
+        <p:spPr>
+          <a:xfrm>
+            <a:off x="838198" y="1825625"/>
+            <a:ext cx="10929731" cy="4351338"/>
+          </a:xfrm>
+        </p:spPr>
         <p:txBody>
           <a:bodyPr/>
           <a:lstStyle/>
@@ -4837,38 +4858,57 @@
             <a:pPr eaLnBrk="1" hangingPunct="1"/>
             <a:r>
               <a:rPr lang="en-US" altLang="en-US" dirty="0"/>
-              <a:t>By identifying unnecessary processes and interactions with this system, wastes can hopefully be eliminated in the future.</a:t>
-            </a:r>
+              <a:t>Eliminated waste:</a:t>
+            </a:r>
+          </a:p>
+          <a:p>
+            <a:pPr lvl="1" eaLnBrk="1" hangingPunct="1"/>
+            <a:r>
+              <a:rPr lang="en-US" altLang="en-US" dirty="0"/>
+              <a:t>Utilizing only a webform to request access ensures that data cannot be omitted and eliminates rework, over-processing and movement.</a:t>
+            </a:r>
+          </a:p>
+          <a:p>
+            <a:pPr lvl="1" eaLnBrk="1" hangingPunct="1"/>
+            <a:r>
+              <a:rPr lang="en-US" altLang="en-US" dirty="0"/>
+              <a:t>A single sorted list of approvers eliminates over-production and over-processing.</a:t>
+            </a:r>
+          </a:p>
+          <a:p>
+            <a:pPr lvl="1" eaLnBrk="1" hangingPunct="1"/>
+            <a:endParaRPr lang="en-US" altLang="en-US" dirty="0"/>
           </a:p>
           <a:p>
             <a:pPr eaLnBrk="1" hangingPunct="1"/>
+            <a:r>
+              <a:rPr lang="en-US" altLang="en-US" dirty="0"/>
+              <a:t>Improved flow:</a:t>
+            </a:r>
+          </a:p>
+          <a:p>
+            <a:pPr lvl="1" eaLnBrk="1" hangingPunct="1"/>
+            <a:r>
+              <a:rPr lang="en-US" altLang="en-US" dirty="0"/>
+              <a:t>Streamlining the process improves efficiency, decreases wait times and allows the user to be notified of the outcome earlier.</a:t>
+            </a:r>
+          </a:p>
+          <a:p>
+            <a:pPr lvl="1" eaLnBrk="1" hangingPunct="1"/>
             <a:endParaRPr lang="en-US" altLang="en-US" dirty="0"/>
           </a:p>
           <a:p>
             <a:pPr eaLnBrk="1" hangingPunct="1"/>
             <a:r>
               <a:rPr lang="en-US" altLang="en-US" dirty="0"/>
-              <a:t>The identified </a:t>
-            </a:r>
-            <a:r>
-              <a:rPr lang="en-CA" dirty="0"/>
-              <a:t>Kaizen Bursts </a:t>
-            </a:r>
-            <a:r>
-              <a:rPr lang="en-US" altLang="en-US" dirty="0"/>
-              <a:t>will allow solutions to target specific aspects of the system.</a:t>
-            </a:r>
-          </a:p>
-          <a:p>
-            <a:pPr eaLnBrk="1" hangingPunct="1"/>
+              <a:t>This model and associated idea sheets will be referenced during discussion and implementation of the improved software.</a:t>
+            </a:r>
+          </a:p>
+          <a:p>
+            <a:pPr marL="0" indent="0" eaLnBrk="1" hangingPunct="1">
+              <a:buNone/>
+            </a:pPr>
             <a:endParaRPr lang="en-US" altLang="en-US" dirty="0"/>
-          </a:p>
-          <a:p>
-            <a:pPr eaLnBrk="1" hangingPunct="1"/>
-            <a:r>
-              <a:rPr lang="en-US" altLang="en-US" dirty="0"/>
-              <a:t>Identifying key issues within the existing software will aid one in considering the overall project deliverables when proposing or implementing solutions.</a:t>
-            </a:r>
           </a:p>
         </p:txBody>
       </p:sp>
@@ -4951,7 +4991,7 @@
         </p:spPr>
         <p:txBody>
           <a:bodyPr rtlCol="0">
-            <a:normAutofit/>
+            <a:normAutofit fontScale="92500" lnSpcReduction="20000"/>
           </a:bodyPr>
           <a:lstStyle/>
           <a:p>
@@ -4975,7 +5015,7 @@
             </a:pPr>
             <a:r>
               <a:rPr lang="en-US" dirty="0"/>
-              <a:t>Answer</a:t>
+              <a:t>We liked being able to discuss potential solutions to previously-identified issues. Although we disliked the amount of time required to develop the idea sheets, we can appreciate their value.</a:t>
             </a:r>
           </a:p>
           <a:p>
@@ -4999,7 +5039,7 @@
             </a:pPr>
             <a:r>
               <a:rPr lang="en-US" dirty="0"/>
-              <a:t>Answer</a:t>
+              <a:t>It was reinforced that multiple potential solutions exist for a particular problem. Team discussion was utilized to agree upon a single solution.</a:t>
             </a:r>
           </a:p>
           <a:p>
@@ -5023,7 +5063,7 @@
             </a:pPr>
             <a:r>
               <a:rPr lang="en-US" dirty="0"/>
-              <a:t>Answer</a:t>
+              <a:t>Within this project, we will use our idea sheets and Future State VSM to guide future development. In our future careers, such documents can be utilized to provide a non-technical overview of the system to stakeholders so that they can be adjusted appropriately prior to implementation.</a:t>
             </a:r>
           </a:p>
           <a:p>
@@ -5047,7 +5087,7 @@
             </a:pPr>
             <a:r>
               <a:rPr lang="en-CA" dirty="0"/>
-              <a:t>Answer</a:t>
+              <a:t>No major hurdles were identified by our group for this milestone.</a:t>
             </a:r>
           </a:p>
         </p:txBody>

</xml_diff>